<commit_message>
Add command alias system to developer guide (#207)
</commit_message>
<xml_diff>
--- a/docs/diagrams/SearchCommandSequenceDiagram.pptx
+++ b/docs/diagrams/SearchCommandSequenceDiagram.pptx
@@ -208,7 +208,7 @@
           <a:p>
             <a:fld id="{F5CC4B3F-88C1-4FFA-B1B6-F41C21DC6924}" type="datetimeFigureOut">
               <a:rPr lang="en-US" smtClean="0"/>
-              <a:t>3/29/2018</a:t>
+              <a:t>4/15/2018</a:t>
             </a:fld>
             <a:endParaRPr lang="en-US"/>
           </a:p>
@@ -738,7 +738,7 @@
           <a:p>
             <a:fld id="{78C97017-6FC3-485B-9764-EAC9E56C1D49}" type="datetimeFigureOut">
               <a:rPr lang="en-US" smtClean="0"/>
-              <a:t>3/29/2018</a:t>
+              <a:t>4/15/2018</a:t>
             </a:fld>
             <a:endParaRPr lang="en-US"/>
           </a:p>
@@ -906,7 +906,7 @@
           <a:p>
             <a:fld id="{78C97017-6FC3-485B-9764-EAC9E56C1D49}" type="datetimeFigureOut">
               <a:rPr lang="en-US" smtClean="0"/>
-              <a:t>3/29/2018</a:t>
+              <a:t>4/15/2018</a:t>
             </a:fld>
             <a:endParaRPr lang="en-US"/>
           </a:p>
@@ -1084,7 +1084,7 @@
           <a:p>
             <a:fld id="{78C97017-6FC3-485B-9764-EAC9E56C1D49}" type="datetimeFigureOut">
               <a:rPr lang="en-US" smtClean="0"/>
-              <a:t>3/29/2018</a:t>
+              <a:t>4/15/2018</a:t>
             </a:fld>
             <a:endParaRPr lang="en-US"/>
           </a:p>
@@ -1252,7 +1252,7 @@
           <a:p>
             <a:fld id="{78C97017-6FC3-485B-9764-EAC9E56C1D49}" type="datetimeFigureOut">
               <a:rPr lang="en-US" smtClean="0"/>
-              <a:t>3/29/2018</a:t>
+              <a:t>4/15/2018</a:t>
             </a:fld>
             <a:endParaRPr lang="en-US"/>
           </a:p>
@@ -1497,7 +1497,7 @@
           <a:p>
             <a:fld id="{78C97017-6FC3-485B-9764-EAC9E56C1D49}" type="datetimeFigureOut">
               <a:rPr lang="en-US" smtClean="0"/>
-              <a:t>3/29/2018</a:t>
+              <a:t>4/15/2018</a:t>
             </a:fld>
             <a:endParaRPr lang="en-US"/>
           </a:p>
@@ -1782,7 +1782,7 @@
           <a:p>
             <a:fld id="{78C97017-6FC3-485B-9764-EAC9E56C1D49}" type="datetimeFigureOut">
               <a:rPr lang="en-US" smtClean="0"/>
-              <a:t>3/29/2018</a:t>
+              <a:t>4/15/2018</a:t>
             </a:fld>
             <a:endParaRPr lang="en-US"/>
           </a:p>
@@ -2201,7 +2201,7 @@
           <a:p>
             <a:fld id="{78C97017-6FC3-485B-9764-EAC9E56C1D49}" type="datetimeFigureOut">
               <a:rPr lang="en-US" smtClean="0"/>
-              <a:t>3/29/2018</a:t>
+              <a:t>4/15/2018</a:t>
             </a:fld>
             <a:endParaRPr lang="en-US"/>
           </a:p>
@@ -2318,7 +2318,7 @@
           <a:p>
             <a:fld id="{78C97017-6FC3-485B-9764-EAC9E56C1D49}" type="datetimeFigureOut">
               <a:rPr lang="en-US" smtClean="0"/>
-              <a:t>3/29/2018</a:t>
+              <a:t>4/15/2018</a:t>
             </a:fld>
             <a:endParaRPr lang="en-US"/>
           </a:p>
@@ -2413,7 +2413,7 @@
           <a:p>
             <a:fld id="{78C97017-6FC3-485B-9764-EAC9E56C1D49}" type="datetimeFigureOut">
               <a:rPr lang="en-US" smtClean="0"/>
-              <a:t>3/29/2018</a:t>
+              <a:t>4/15/2018</a:t>
             </a:fld>
             <a:endParaRPr lang="en-US"/>
           </a:p>
@@ -2688,7 +2688,7 @@
           <a:p>
             <a:fld id="{78C97017-6FC3-485B-9764-EAC9E56C1D49}" type="datetimeFigureOut">
               <a:rPr lang="en-US" smtClean="0"/>
-              <a:t>3/29/2018</a:t>
+              <a:t>4/15/2018</a:t>
             </a:fld>
             <a:endParaRPr lang="en-US"/>
           </a:p>
@@ -2940,7 +2940,7 @@
           <a:p>
             <a:fld id="{78C97017-6FC3-485B-9764-EAC9E56C1D49}" type="datetimeFigureOut">
               <a:rPr lang="en-US" smtClean="0"/>
-              <a:t>3/29/2018</a:t>
+              <a:t>4/15/2018</a:t>
             </a:fld>
             <a:endParaRPr lang="en-US"/>
           </a:p>
@@ -3151,7 +3151,7 @@
           <a:p>
             <a:fld id="{78C97017-6FC3-485B-9764-EAC9E56C1D49}" type="datetimeFigureOut">
               <a:rPr lang="en-US" smtClean="0"/>
-              <a:t>3/29/2018</a:t>
+              <a:t>4/15/2018</a:t>
             </a:fld>
             <a:endParaRPr lang="en-US"/>
           </a:p>
@@ -4110,7 +4110,7 @@
           <a:lstStyle/>
           <a:p>
             <a:r>
-              <a:rPr lang="en-US" sz="1400" smtClean="0"/>
+              <a:rPr lang="en-US" sz="1400"/>
               <a:t>search Artemis</a:t>
             </a:r>
             <a:endParaRPr lang="en-US" sz="1400" dirty="0"/>
@@ -4183,15 +4183,7 @@
                   <a:srgbClr val="0070C0"/>
                 </a:solidFill>
               </a:rPr>
-              <a:t>execute</a:t>
-            </a:r>
-            <a:r>
-              <a:rPr lang="en-US" sz="1400" smtClean="0">
-                <a:solidFill>
-                  <a:srgbClr val="0070C0"/>
-                </a:solidFill>
-              </a:rPr>
-              <a:t>(“search Artemis”)</a:t>
+              <a:t>execute(“search Artemis”)</a:t>
             </a:r>
             <a:endParaRPr lang="en-US" sz="1400" dirty="0">
               <a:solidFill>
@@ -4328,7 +4320,7 @@
         </p:nvSpPr>
         <p:spPr>
           <a:xfrm>
-            <a:off x="7239000" y="1077825"/>
+            <a:off x="7239000" y="620625"/>
             <a:ext cx="1371600" cy="346760"/>
           </a:xfrm>
           <a:prstGeom prst="rect">
@@ -4368,7 +4360,7 @@
           <a:p>
             <a:pPr algn="ctr"/>
             <a:r>
-              <a:rPr lang="en-US" sz="1600" smtClean="0">
+              <a:rPr lang="en-US" sz="1600">
                 <a:solidFill>
                   <a:schemeClr val="bg1"/>
                 </a:solidFill>
@@ -4393,8 +4385,8 @@
         </p:nvCxnSpPr>
         <p:spPr>
           <a:xfrm>
-            <a:off x="7967173" y="1390407"/>
-            <a:ext cx="0" cy="2419593"/>
+            <a:off x="7967173" y="933207"/>
+            <a:ext cx="0" cy="2800593"/>
           </a:xfrm>
           <a:prstGeom prst="line">
             <a:avLst/>
@@ -4553,7 +4545,7 @@
         <p:spPr>
           <a:xfrm>
             <a:off x="3647733" y="921641"/>
-            <a:ext cx="0" cy="2561660"/>
+            <a:ext cx="0" cy="2812159"/>
           </a:xfrm>
           <a:prstGeom prst="line">
             <a:avLst/>
@@ -4726,14 +4718,6 @@
               </a:rPr>
               <a:t>(</a:t>
             </a:r>
-            <a:r>
-              <a:rPr lang="en-US" sz="1400">
-                <a:solidFill>
-                  <a:srgbClr val="0070C0"/>
-                </a:solidFill>
-              </a:rPr>
-              <a:t/>
-            </a:r>
             <a:br>
               <a:rPr lang="en-US" sz="1400">
                 <a:solidFill>
@@ -4742,7 +4726,7 @@
               </a:rPr>
             </a:br>
             <a:r>
-              <a:rPr lang="en-US" sz="1400" smtClean="0">
+              <a:rPr lang="en-US" sz="1400">
                 <a:solidFill>
                   <a:srgbClr val="0070C0"/>
                 </a:solidFill>
@@ -4807,7 +4791,7 @@
           <a:p>
             <a:pPr algn="ctr"/>
             <a:r>
-              <a:rPr lang="en-US" sz="1600" smtClean="0">
+              <a:rPr lang="en-US" sz="1600">
                 <a:solidFill>
                   <a:schemeClr val="bg1"/>
                 </a:solidFill>
@@ -5417,7 +5401,7 @@
           <a:lstStyle/>
           <a:p>
             <a:r>
-              <a:rPr lang="en-US" sz="1400" smtClean="0">
+              <a:rPr lang="en-US" sz="1400">
                 <a:solidFill>
                   <a:schemeClr val="accent2">
                     <a:lumMod val="75000"/>
@@ -5537,15 +5521,7 @@
                   <a:schemeClr val="bg1"/>
                 </a:solidFill>
               </a:rPr>
-              <a:t>p</a:t>
-            </a:r>
-            <a:r>
-              <a:rPr lang="en-US" sz="1600" smtClean="0">
-                <a:solidFill>
-                  <a:schemeClr val="bg1"/>
-                </a:solidFill>
-              </a:rPr>
-              <a:t>:SearchCommandParser</a:t>
+              <a:t>p:SearchCommandParser</a:t>
             </a:r>
             <a:endParaRPr lang="en-SG" sz="1600" dirty="0">
               <a:solidFill>
@@ -5878,7 +5854,7 @@
           <a:lstStyle/>
           <a:p>
             <a:r>
-              <a:rPr lang="en-US" sz="1400" smtClean="0">
+              <a:rPr lang="en-US" sz="1400">
                 <a:solidFill>
                   <a:srgbClr val="0070C0"/>
                 </a:solidFill>
@@ -6012,7 +5988,7 @@
           <a:lstStyle/>
           <a:p>
             <a:r>
-              <a:rPr lang="en-US" sz="1400" smtClean="0">
+              <a:rPr lang="en-US" sz="1400">
                 <a:solidFill>
                   <a:srgbClr val="0070C0"/>
                 </a:solidFill>
@@ -6056,7 +6032,7 @@
           <a:lstStyle/>
           <a:p>
             <a:r>
-              <a:rPr lang="en-US" sz="1400" smtClean="0">
+              <a:rPr lang="en-US" sz="1400">
                 <a:solidFill>
                   <a:srgbClr val="0070C0"/>
                 </a:solidFill>

</xml_diff>